<commit_message>
Combined all physiology scripts into one script, generated new figures for physiology data
</commit_message>
<xml_diff>
--- a/Mcap2020/PPT_files/Mcap_2020_figs.pptx
+++ b/Mcap2020/PPT_files/Mcap_2020_figs.pptx
@@ -107,6 +107,11 @@
       </a:defRPr>
     </a:lvl9pPr>
   </p:defaultTextStyle>
+  <p:extLst>
+    <p:ext uri="{EFAFB233-063F-42B5-8137-9DF3F51BA10A}">
+      <p15:sldGuideLst xmlns:p15="http://schemas.microsoft.com/office/powerpoint/2012/main"/>
+    </p:ext>
+  </p:extLst>
 </p:presentation>
 </file>
 
@@ -192,7 +197,7 @@
           <a:p>
             <a:fld id="{3A432A35-74DD-234F-BDFF-97E970113162}" type="datetimeFigureOut">
               <a:rPr lang="en-US" smtClean="0"/>
-              <a:t>1/3/22</a:t>
+              <a:t>1/6/22</a:t>
             </a:fld>
             <a:endParaRPr lang="en-US"/>
           </a:p>
@@ -690,7 +695,7 @@
           <a:p>
             <a:fld id="{BE0BD201-9EAE-174B-AC7F-E17FC5DCF497}" type="datetimeFigureOut">
               <a:rPr lang="en-US" smtClean="0"/>
-              <a:t>1/3/22</a:t>
+              <a:t>1/6/22</a:t>
             </a:fld>
             <a:endParaRPr lang="en-US"/>
           </a:p>
@@ -888,7 +893,7 @@
           <a:p>
             <a:fld id="{BE0BD201-9EAE-174B-AC7F-E17FC5DCF497}" type="datetimeFigureOut">
               <a:rPr lang="en-US" smtClean="0"/>
-              <a:t>1/3/22</a:t>
+              <a:t>1/6/22</a:t>
             </a:fld>
             <a:endParaRPr lang="en-US"/>
           </a:p>
@@ -1096,7 +1101,7 @@
           <a:p>
             <a:fld id="{BE0BD201-9EAE-174B-AC7F-E17FC5DCF497}" type="datetimeFigureOut">
               <a:rPr lang="en-US" smtClean="0"/>
-              <a:t>1/3/22</a:t>
+              <a:t>1/6/22</a:t>
             </a:fld>
             <a:endParaRPr lang="en-US"/>
           </a:p>
@@ -1294,7 +1299,7 @@
           <a:p>
             <a:fld id="{BE0BD201-9EAE-174B-AC7F-E17FC5DCF497}" type="datetimeFigureOut">
               <a:rPr lang="en-US" smtClean="0"/>
-              <a:t>1/3/22</a:t>
+              <a:t>1/6/22</a:t>
             </a:fld>
             <a:endParaRPr lang="en-US"/>
           </a:p>
@@ -1569,7 +1574,7 @@
           <a:p>
             <a:fld id="{BE0BD201-9EAE-174B-AC7F-E17FC5DCF497}" type="datetimeFigureOut">
               <a:rPr lang="en-US" smtClean="0"/>
-              <a:t>1/3/22</a:t>
+              <a:t>1/6/22</a:t>
             </a:fld>
             <a:endParaRPr lang="en-US"/>
           </a:p>
@@ -1834,7 +1839,7 @@
           <a:p>
             <a:fld id="{BE0BD201-9EAE-174B-AC7F-E17FC5DCF497}" type="datetimeFigureOut">
               <a:rPr lang="en-US" smtClean="0"/>
-              <a:t>1/3/22</a:t>
+              <a:t>1/6/22</a:t>
             </a:fld>
             <a:endParaRPr lang="en-US"/>
           </a:p>
@@ -2246,7 +2251,7 @@
           <a:p>
             <a:fld id="{BE0BD201-9EAE-174B-AC7F-E17FC5DCF497}" type="datetimeFigureOut">
               <a:rPr lang="en-US" smtClean="0"/>
-              <a:t>1/3/22</a:t>
+              <a:t>1/6/22</a:t>
             </a:fld>
             <a:endParaRPr lang="en-US"/>
           </a:p>
@@ -2387,7 +2392,7 @@
           <a:p>
             <a:fld id="{BE0BD201-9EAE-174B-AC7F-E17FC5DCF497}" type="datetimeFigureOut">
               <a:rPr lang="en-US" smtClean="0"/>
-              <a:t>1/3/22</a:t>
+              <a:t>1/6/22</a:t>
             </a:fld>
             <a:endParaRPr lang="en-US"/>
           </a:p>
@@ -2500,7 +2505,7 @@
           <a:p>
             <a:fld id="{BE0BD201-9EAE-174B-AC7F-E17FC5DCF497}" type="datetimeFigureOut">
               <a:rPr lang="en-US" smtClean="0"/>
-              <a:t>1/3/22</a:t>
+              <a:t>1/6/22</a:t>
             </a:fld>
             <a:endParaRPr lang="en-US"/>
           </a:p>
@@ -2811,7 +2816,7 @@
           <a:p>
             <a:fld id="{BE0BD201-9EAE-174B-AC7F-E17FC5DCF497}" type="datetimeFigureOut">
               <a:rPr lang="en-US" smtClean="0"/>
-              <a:t>1/3/22</a:t>
+              <a:t>1/6/22</a:t>
             </a:fld>
             <a:endParaRPr lang="en-US"/>
           </a:p>
@@ -3099,7 +3104,7 @@
           <a:p>
             <a:fld id="{BE0BD201-9EAE-174B-AC7F-E17FC5DCF497}" type="datetimeFigureOut">
               <a:rPr lang="en-US" smtClean="0"/>
-              <a:t>1/3/22</a:t>
+              <a:t>1/6/22</a:t>
             </a:fld>
             <a:endParaRPr lang="en-US"/>
           </a:p>
@@ -3340,7 +3345,7 @@
           <a:p>
             <a:fld id="{BE0BD201-9EAE-174B-AC7F-E17FC5DCF497}" type="datetimeFigureOut">
               <a:rPr lang="en-US" smtClean="0"/>
-              <a:t>1/3/22</a:t>
+              <a:t>1/6/22</a:t>
             </a:fld>
             <a:endParaRPr lang="en-US"/>
           </a:p>
@@ -4004,7 +4009,7 @@
           <p:nvPr>
             <p:extLst>
               <p:ext uri="{D42A27DB-BD31-4B8C-83A1-F6EECF244321}">
-                <p14:modId xmlns:p14="http://schemas.microsoft.com/office/powerpoint/2010/main" val="1152883520"/>
+                <p14:modId xmlns:p14="http://schemas.microsoft.com/office/powerpoint/2010/main" val="3380942212"/>
               </p:ext>
             </p:extLst>
           </p:nvPr>
@@ -5818,7 +5823,7 @@
                     <a:bodyPr/>
                     <a:lstStyle/>
                     <a:p>
-                      <a:endParaRPr lang="en-US"/>
+                      <a:endParaRPr lang="en-US" dirty="0"/>
                     </a:p>
                   </a:txBody>
                   <a:tcPr>
@@ -5858,9 +5863,7 @@
                       <a:headEnd type="none" w="med" len="med"/>
                       <a:tailEnd type="none" w="med" len="med"/>
                     </a:lnB>
-                    <a:solidFill>
-                      <a:srgbClr val="FF80A9"/>
-                    </a:solidFill>
+                    <a:noFill/>
                   </a:tcPr>
                 </a:tc>
                 <a:tc>
@@ -5968,7 +5971,7 @@
                     <a:bodyPr/>
                     <a:lstStyle/>
                     <a:p>
-                      <a:endParaRPr lang="en-US"/>
+                      <a:endParaRPr lang="en-US" dirty="0"/>
                     </a:p>
                   </a:txBody>
                   <a:tcPr>
@@ -6008,9 +6011,7 @@
                       <a:headEnd type="none" w="med" len="med"/>
                       <a:tailEnd type="none" w="med" len="med"/>
                     </a:lnB>
-                    <a:solidFill>
-                      <a:srgbClr val="FF80A9"/>
-                    </a:solidFill>
+                    <a:noFill/>
                   </a:tcPr>
                 </a:tc>
                 <a:tc>
@@ -6058,9 +6059,7 @@
                       <a:headEnd type="none" w="med" len="med"/>
                       <a:tailEnd type="none" w="med" len="med"/>
                     </a:lnB>
-                    <a:solidFill>
-                      <a:srgbClr val="FF80A9"/>
-                    </a:solidFill>
+                    <a:noFill/>
                   </a:tcPr>
                 </a:tc>
                 <a:extLst>

</xml_diff>